<commit_message>
edited the event listener
</commit_message>
<xml_diff>
--- a/assets/journal now presentation.pptx
+++ b/assets/journal now presentation.pptx
@@ -6364,7 +6364,7 @@
               </a:lnSpc>
             </a:pPr>
             <a:r>
-              <a:rPr lang="en-US" sz="1100"/>
+              <a:rPr lang="en-US" sz="1100" dirty="0"/>
               <a:t>JAVASCRIPT </a:t>
             </a:r>
           </a:p>
@@ -6375,7 +6375,7 @@
               </a:lnSpc>
             </a:pPr>
             <a:r>
-              <a:rPr lang="en-US" sz="1100"/>
+              <a:rPr lang="en-US" sz="1100" dirty="0"/>
               <a:t>Created js. folder</a:t>
             </a:r>
           </a:p>
@@ -6386,7 +6386,7 @@
               </a:lnSpc>
             </a:pPr>
             <a:r>
-              <a:rPr lang="en-US" sz="1100"/>
+              <a:rPr lang="en-US" sz="1100" dirty="0"/>
               <a:t>Created first js. File app.js for index page</a:t>
             </a:r>
           </a:p>
@@ -6397,7 +6397,7 @@
               </a:lnSpc>
             </a:pPr>
             <a:r>
-              <a:rPr lang="en-US" sz="1100"/>
+              <a:rPr lang="en-US" sz="1100" dirty="0"/>
               <a:t>Created second js. File dashboard.js</a:t>
             </a:r>
           </a:p>
@@ -6408,7 +6408,7 @@
               </a:lnSpc>
             </a:pPr>
             <a:r>
-              <a:rPr lang="en-US" sz="1100"/>
+              <a:rPr lang="en-US" sz="1100" dirty="0"/>
               <a:t>Validated inputs for app.js file</a:t>
             </a:r>
           </a:p>
@@ -6419,7 +6419,7 @@
               </a:lnSpc>
             </a:pPr>
             <a:r>
-              <a:rPr lang="en-US" sz="1100"/>
+              <a:rPr lang="en-US" sz="1100" dirty="0"/>
               <a:t>Created event listener for the index page sign in form directing user to dashboard page</a:t>
             </a:r>
           </a:p>
@@ -6430,7 +6430,7 @@
               </a:lnSpc>
             </a:pPr>
             <a:r>
-              <a:rPr lang="en-US" sz="1100"/>
+              <a:rPr lang="en-US" sz="1100" dirty="0"/>
               <a:t>Validated inputs for dashboard.js</a:t>
             </a:r>
           </a:p>
@@ -6441,7 +6441,7 @@
               </a:lnSpc>
             </a:pPr>
             <a:r>
-              <a:rPr lang="en-US" sz="1100"/>
+              <a:rPr lang="en-US" sz="1100" dirty="0"/>
               <a:t>Created event listener for the dashboard form which enabled user to add their story to company intranet </a:t>
             </a:r>
           </a:p>
@@ -6451,7 +6451,7 @@
                 <a:spcPct val="90000"/>
               </a:lnSpc>
             </a:pPr>
-            <a:endParaRPr lang="en-US" sz="1100"/>
+            <a:endParaRPr lang="en-US" sz="1100" dirty="0"/>
           </a:p>
           <a:p>
             <a:pPr>
@@ -6459,7 +6459,7 @@
                 <a:spcPct val="90000"/>
               </a:lnSpc>
             </a:pPr>
-            <a:endParaRPr lang="en-US" sz="1100"/>
+            <a:endParaRPr lang="en-US" sz="1100" dirty="0"/>
           </a:p>
         </p:txBody>
       </p:sp>
@@ -6870,164 +6870,190 @@
       </p:graphicFrame>
       <p:pic>
         <p:nvPicPr>
-          <p:cNvPr id="5" name="Picture 4">
+          <p:cNvPr id="1026" name="Picture 2" descr="The best journaling apps for iPhone and iPad">
             <a:extLst>
               <a:ext uri="{FF2B5EF4-FFF2-40B4-BE49-F238E27FC236}">
-                <a16:creationId xmlns:a16="http://schemas.microsoft.com/office/drawing/2014/main" id="{FFB29011-B32B-4566-A4C8-3A7FEB8544B5}"/>
+                <a16:creationId xmlns:a16="http://schemas.microsoft.com/office/drawing/2014/main" id="{D0E93035-5B53-4E74-9431-F98DE86E5F61}"/>
               </a:ext>
             </a:extLst>
           </p:cNvPr>
           <p:cNvPicPr>
-            <a:picLocks noChangeAspect="1"/>
+            <a:picLocks noChangeAspect="1" noChangeArrowheads="1"/>
           </p:cNvPicPr>
           <p:nvPr/>
         </p:nvPicPr>
         <p:blipFill>
-          <a:blip r:embed="rId7"/>
+          <a:blip r:embed="rId7">
+            <a:extLst>
+              <a:ext uri="{28A0092B-C50C-407E-A947-70E740481C1C}">
+                <a14:useLocalDpi xmlns:a14="http://schemas.microsoft.com/office/drawing/2010/main" val="0"/>
+              </a:ext>
+            </a:extLst>
+          </a:blip>
+          <a:srcRect/>
           <a:stretch>
             <a:fillRect/>
           </a:stretch>
         </p:blipFill>
-        <p:spPr>
+        <p:spPr bwMode="auto">
           <a:xfrm>
-            <a:off x="4704522" y="2449727"/>
-            <a:ext cx="2820953" cy="1911194"/>
+            <a:off x="5024438" y="2362200"/>
+            <a:ext cx="2143125" cy="2133600"/>
           </a:xfrm>
           <a:prstGeom prst="rect">
             <a:avLst/>
           </a:prstGeom>
-          <a:ln w="31750" cap="sq">
-            <a:solidFill>
-              <a:srgbClr val="FFFFFF"/>
-            </a:solidFill>
-            <a:miter lim="800000"/>
-          </a:ln>
+          <a:noFill/>
+          <a:extLst>
+            <a:ext uri="{909E8E84-426E-40DD-AFC4-6F175D3DCCD1}">
+              <a14:hiddenFill xmlns:a14="http://schemas.microsoft.com/office/drawing/2010/main">
+                <a:solidFill>
+                  <a:srgbClr val="FFFFFF"/>
+                </a:solidFill>
+              </a14:hiddenFill>
+            </a:ext>
+          </a:extLst>
         </p:spPr>
       </p:pic>
       <p:pic>
         <p:nvPicPr>
-          <p:cNvPr id="7" name="Picture 6">
+          <p:cNvPr id="1032" name="Picture 8" descr="The best journaling apps for iPhone and iPad">
             <a:extLst>
               <a:ext uri="{FF2B5EF4-FFF2-40B4-BE49-F238E27FC236}">
-                <a16:creationId xmlns:a16="http://schemas.microsoft.com/office/drawing/2014/main" id="{C9CB9318-2224-4622-81A9-20C94DFB04D2}"/>
+                <a16:creationId xmlns:a16="http://schemas.microsoft.com/office/drawing/2014/main" id="{4CB9EB90-C874-4E44-807F-34C63C646F4C}"/>
               </a:ext>
             </a:extLst>
           </p:cNvPr>
           <p:cNvPicPr>
-            <a:picLocks noChangeAspect="1"/>
+            <a:picLocks noChangeAspect="1" noChangeArrowheads="1"/>
           </p:cNvPicPr>
           <p:nvPr/>
         </p:nvPicPr>
         <p:blipFill>
-          <a:blip r:embed="rId8"/>
+          <a:blip r:embed="rId8">
+            <a:extLst>
+              <a:ext uri="{28A0092B-C50C-407E-A947-70E740481C1C}">
+                <a14:useLocalDpi xmlns:a14="http://schemas.microsoft.com/office/drawing/2010/main" val="0"/>
+              </a:ext>
+            </a:extLst>
+          </a:blip>
+          <a:srcRect/>
           <a:stretch>
             <a:fillRect/>
           </a:stretch>
         </p:blipFill>
-        <p:spPr>
+        <p:spPr bwMode="auto">
           <a:xfrm>
-            <a:off x="8035236" y="2485897"/>
-            <a:ext cx="3196644" cy="1841878"/>
+            <a:off x="7888771" y="2362200"/>
+            <a:ext cx="2152650" cy="2124075"/>
           </a:xfrm>
           <a:prstGeom prst="rect">
             <a:avLst/>
           </a:prstGeom>
-          <a:ln w="31750" cap="sq">
-            <a:solidFill>
-              <a:srgbClr val="FFFFFF"/>
-            </a:solidFill>
-            <a:miter lim="800000"/>
-          </a:ln>
+          <a:noFill/>
+          <a:extLst>
+            <a:ext uri="{909E8E84-426E-40DD-AFC4-6F175D3DCCD1}">
+              <a14:hiddenFill xmlns:a14="http://schemas.microsoft.com/office/drawing/2010/main">
+                <a:solidFill>
+                  <a:srgbClr val="FFFFFF"/>
+                </a:solidFill>
+              </a14:hiddenFill>
+            </a:ext>
+          </a:extLst>
         </p:spPr>
       </p:pic>
       <p:pic>
         <p:nvPicPr>
-          <p:cNvPr id="9" name="Picture 8">
+          <p:cNvPr id="1034" name="Picture 10" descr="Journal App designs, themes, templates and downloadable graphic elements on  Dribbble">
             <a:extLst>
               <a:ext uri="{FF2B5EF4-FFF2-40B4-BE49-F238E27FC236}">
-                <a16:creationId xmlns:a16="http://schemas.microsoft.com/office/drawing/2014/main" id="{72553E39-2E1E-49E4-9BDF-88CA1EC45D7F}"/>
+                <a16:creationId xmlns:a16="http://schemas.microsoft.com/office/drawing/2014/main" id="{82C11DB6-EC46-4665-BA04-8AEB8018CFEA}"/>
               </a:ext>
             </a:extLst>
           </p:cNvPr>
           <p:cNvPicPr>
-            <a:picLocks noChangeAspect="1"/>
+            <a:picLocks noChangeAspect="1" noChangeArrowheads="1"/>
           </p:cNvPicPr>
           <p:nvPr/>
         </p:nvPicPr>
         <p:blipFill>
-          <a:blip r:embed="rId9"/>
+          <a:blip r:embed="rId9">
+            <a:extLst>
+              <a:ext uri="{28A0092B-C50C-407E-A947-70E740481C1C}">
+                <a14:useLocalDpi xmlns:a14="http://schemas.microsoft.com/office/drawing/2010/main" val="0"/>
+              </a:ext>
+            </a:extLst>
+          </a:blip>
+          <a:srcRect/>
           <a:stretch>
             <a:fillRect/>
           </a:stretch>
         </p:blipFill>
-        <p:spPr>
+        <p:spPr bwMode="auto">
           <a:xfrm>
-            <a:off x="4667773" y="4760623"/>
-            <a:ext cx="2820953" cy="1722130"/>
+            <a:off x="5024438" y="4704588"/>
+            <a:ext cx="2143125" cy="1847850"/>
           </a:xfrm>
           <a:prstGeom prst="rect">
             <a:avLst/>
           </a:prstGeom>
+          <a:noFill/>
+          <a:extLst>
+            <a:ext uri="{909E8E84-426E-40DD-AFC4-6F175D3DCCD1}">
+              <a14:hiddenFill xmlns:a14="http://schemas.microsoft.com/office/drawing/2010/main">
+                <a:solidFill>
+                  <a:srgbClr val="FFFFFF"/>
+                </a:solidFill>
+              </a14:hiddenFill>
+            </a:ext>
+          </a:extLst>
         </p:spPr>
       </p:pic>
       <p:pic>
         <p:nvPicPr>
-          <p:cNvPr id="11" name="Picture 10">
+          <p:cNvPr id="1036" name="Picture 12" descr="Prompted Journal — Raccoon Technology (DarlingApps)">
             <a:extLst>
               <a:ext uri="{FF2B5EF4-FFF2-40B4-BE49-F238E27FC236}">
-                <a16:creationId xmlns:a16="http://schemas.microsoft.com/office/drawing/2014/main" id="{D0599D5C-0D85-4867-A438-05DB873ACE1C}"/>
+                <a16:creationId xmlns:a16="http://schemas.microsoft.com/office/drawing/2014/main" id="{37EB3B9F-4B51-47E4-AD5E-6565A259C899}"/>
               </a:ext>
             </a:extLst>
           </p:cNvPr>
           <p:cNvPicPr>
-            <a:picLocks noChangeAspect="1"/>
+            <a:picLocks noChangeAspect="1" noChangeArrowheads="1"/>
           </p:cNvPicPr>
           <p:nvPr/>
         </p:nvPicPr>
         <p:blipFill>
-          <a:blip r:embed="rId10"/>
+          <a:blip r:embed="rId10">
+            <a:extLst>
+              <a:ext uri="{28A0092B-C50C-407E-A947-70E740481C1C}">
+                <a14:useLocalDpi xmlns:a14="http://schemas.microsoft.com/office/drawing/2010/main" val="0"/>
+              </a:ext>
+            </a:extLst>
+          </a:blip>
+          <a:srcRect/>
           <a:stretch>
             <a:fillRect/>
           </a:stretch>
         </p:blipFill>
-        <p:spPr>
+        <p:spPr bwMode="auto">
           <a:xfrm>
-            <a:off x="8035236" y="4769966"/>
-            <a:ext cx="1508978" cy="1733835"/>
+            <a:off x="8153815" y="4576212"/>
+            <a:ext cx="1705803" cy="2065360"/>
           </a:xfrm>
           <a:prstGeom prst="rect">
             <a:avLst/>
           </a:prstGeom>
-        </p:spPr>
-      </p:pic>
-      <p:pic>
-        <p:nvPicPr>
-          <p:cNvPr id="15" name="Picture 14">
-            <a:extLst>
-              <a:ext uri="{FF2B5EF4-FFF2-40B4-BE49-F238E27FC236}">
-                <a16:creationId xmlns:a16="http://schemas.microsoft.com/office/drawing/2014/main" id="{04CCAAD8-2171-49A9-B797-A8A928948A30}"/>
-              </a:ext>
-            </a:extLst>
-          </p:cNvPr>
-          <p:cNvPicPr>
-            <a:picLocks noChangeAspect="1"/>
-          </p:cNvPicPr>
-          <p:nvPr/>
-        </p:nvPicPr>
-        <p:blipFill>
-          <a:blip r:embed="rId11"/>
-          <a:stretch>
-            <a:fillRect/>
-          </a:stretch>
-        </p:blipFill>
-        <p:spPr>
-          <a:xfrm>
-            <a:off x="9701878" y="4769966"/>
-            <a:ext cx="1530001" cy="1722130"/>
-          </a:xfrm>
-          <a:prstGeom prst="rect">
-            <a:avLst/>
-          </a:prstGeom>
+          <a:noFill/>
+          <a:extLst>
+            <a:ext uri="{909E8E84-426E-40DD-AFC4-6F175D3DCCD1}">
+              <a14:hiddenFill xmlns:a14="http://schemas.microsoft.com/office/drawing/2010/main">
+                <a:solidFill>
+                  <a:srgbClr val="FFFFFF"/>
+                </a:solidFill>
+              </a14:hiddenFill>
+            </a:ext>
+          </a:extLst>
         </p:spPr>
       </p:pic>
     </p:spTree>
@@ -8575,7 +8601,7 @@
           <a:p>
             <a:r>
               <a:rPr lang="en-US" dirty="0"/>
-              <a:t>1.Create Project</a:t>
+              <a:t>1.Xano to create database</a:t>
             </a:r>
           </a:p>
           <a:p>
@@ -8615,12 +8641,10 @@
           <a:p>
             <a:r>
               <a:rPr lang="en-US" dirty="0"/>
-              <a:t>5. Test database </a:t>
-            </a:r>
-            <a:r>
-              <a:rPr lang="en-US"/>
-              <a:t>in browser</a:t>
-            </a:r>
+              <a:t>5. Test database in browser</a:t>
+            </a:r>
+          </a:p>
+          <a:p>
             <a:endParaRPr lang="en-US" dirty="0"/>
           </a:p>
         </p:txBody>

</xml_diff>